<commit_message>
Logo to be ABBA-like style (#24)
</commit_message>
<xml_diff>
--- a/assets/logo-b.pptx
+++ b/assets/logo-b.pptx
@@ -243,7 +243,7 @@
           <a:p>
             <a:fld id="{3A3EC29E-C368-4866-8016-F0D15F380C02}" type="datetimeFigureOut">
               <a:rPr lang="zh-CN" altLang="en-US" smtClean="0"/>
-              <a:t>2025/5/8</a:t>
+              <a:t>2025/5/12</a:t>
             </a:fld>
             <a:endParaRPr lang="zh-CN" altLang="en-US"/>
           </a:p>
@@ -413,7 +413,7 @@
           <a:p>
             <a:fld id="{3A3EC29E-C368-4866-8016-F0D15F380C02}" type="datetimeFigureOut">
               <a:rPr lang="zh-CN" altLang="en-US" smtClean="0"/>
-              <a:t>2025/5/8</a:t>
+              <a:t>2025/5/12</a:t>
             </a:fld>
             <a:endParaRPr lang="zh-CN" altLang="en-US"/>
           </a:p>
@@ -593,7 +593,7 @@
           <a:p>
             <a:fld id="{3A3EC29E-C368-4866-8016-F0D15F380C02}" type="datetimeFigureOut">
               <a:rPr lang="zh-CN" altLang="en-US" smtClean="0"/>
-              <a:t>2025/5/8</a:t>
+              <a:t>2025/5/12</a:t>
             </a:fld>
             <a:endParaRPr lang="zh-CN" altLang="en-US"/>
           </a:p>
@@ -763,7 +763,7 @@
           <a:p>
             <a:fld id="{3A3EC29E-C368-4866-8016-F0D15F380C02}" type="datetimeFigureOut">
               <a:rPr lang="zh-CN" altLang="en-US" smtClean="0"/>
-              <a:t>2025/5/8</a:t>
+              <a:t>2025/5/12</a:t>
             </a:fld>
             <a:endParaRPr lang="zh-CN" altLang="en-US"/>
           </a:p>
@@ -1009,7 +1009,7 @@
           <a:p>
             <a:fld id="{3A3EC29E-C368-4866-8016-F0D15F380C02}" type="datetimeFigureOut">
               <a:rPr lang="zh-CN" altLang="en-US" smtClean="0"/>
-              <a:t>2025/5/8</a:t>
+              <a:t>2025/5/12</a:t>
             </a:fld>
             <a:endParaRPr lang="zh-CN" altLang="en-US"/>
           </a:p>
@@ -1241,7 +1241,7 @@
           <a:p>
             <a:fld id="{3A3EC29E-C368-4866-8016-F0D15F380C02}" type="datetimeFigureOut">
               <a:rPr lang="zh-CN" altLang="en-US" smtClean="0"/>
-              <a:t>2025/5/8</a:t>
+              <a:t>2025/5/12</a:t>
             </a:fld>
             <a:endParaRPr lang="zh-CN" altLang="en-US"/>
           </a:p>
@@ -1608,7 +1608,7 @@
           <a:p>
             <a:fld id="{3A3EC29E-C368-4866-8016-F0D15F380C02}" type="datetimeFigureOut">
               <a:rPr lang="zh-CN" altLang="en-US" smtClean="0"/>
-              <a:t>2025/5/8</a:t>
+              <a:t>2025/5/12</a:t>
             </a:fld>
             <a:endParaRPr lang="zh-CN" altLang="en-US"/>
           </a:p>
@@ -1726,7 +1726,7 @@
           <a:p>
             <a:fld id="{3A3EC29E-C368-4866-8016-F0D15F380C02}" type="datetimeFigureOut">
               <a:rPr lang="zh-CN" altLang="en-US" smtClean="0"/>
-              <a:t>2025/5/8</a:t>
+              <a:t>2025/5/12</a:t>
             </a:fld>
             <a:endParaRPr lang="zh-CN" altLang="en-US"/>
           </a:p>
@@ -1821,7 +1821,7 @@
           <a:p>
             <a:fld id="{3A3EC29E-C368-4866-8016-F0D15F380C02}" type="datetimeFigureOut">
               <a:rPr lang="zh-CN" altLang="en-US" smtClean="0"/>
-              <a:t>2025/5/8</a:t>
+              <a:t>2025/5/12</a:t>
             </a:fld>
             <a:endParaRPr lang="zh-CN" altLang="en-US"/>
           </a:p>
@@ -2098,7 +2098,7 @@
           <a:p>
             <a:fld id="{3A3EC29E-C368-4866-8016-F0D15F380C02}" type="datetimeFigureOut">
               <a:rPr lang="zh-CN" altLang="en-US" smtClean="0"/>
-              <a:t>2025/5/8</a:t>
+              <a:t>2025/5/12</a:t>
             </a:fld>
             <a:endParaRPr lang="zh-CN" altLang="en-US"/>
           </a:p>
@@ -2355,7 +2355,7 @@
           <a:p>
             <a:fld id="{3A3EC29E-C368-4866-8016-F0D15F380C02}" type="datetimeFigureOut">
               <a:rPr lang="zh-CN" altLang="en-US" smtClean="0"/>
-              <a:t>2025/5/8</a:t>
+              <a:t>2025/5/12</a:t>
             </a:fld>
             <a:endParaRPr lang="zh-CN" altLang="en-US"/>
           </a:p>
@@ -2568,7 +2568,7 @@
           <a:p>
             <a:fld id="{3A3EC29E-C368-4866-8016-F0D15F380C02}" type="datetimeFigureOut">
               <a:rPr lang="zh-CN" altLang="en-US" smtClean="0"/>
-              <a:t>2025/5/8</a:t>
+              <a:t>2025/5/12</a:t>
             </a:fld>
             <a:endParaRPr lang="zh-CN" altLang="en-US"/>
           </a:p>
@@ -2973,6 +2973,98 @@
           <a:chExt cx="0" cy="0"/>
         </a:xfrm>
       </p:grpSpPr>
+      <p:sp>
+        <p:nvSpPr>
+          <p:cNvPr id="11" name="矩形 10">
+            <a:extLst>
+              <a:ext uri="{FF2B5EF4-FFF2-40B4-BE49-F238E27FC236}">
+                <a16:creationId xmlns:a16="http://schemas.microsoft.com/office/drawing/2014/main" id="{98A106DE-16BC-4216-4C37-AA7A620DC008}"/>
+              </a:ext>
+            </a:extLst>
+          </p:cNvPr>
+          <p:cNvSpPr/>
+          <p:nvPr/>
+        </p:nvSpPr>
+        <p:spPr>
+          <a:xfrm>
+            <a:off x="3874656" y="1000349"/>
+            <a:ext cx="3411935" cy="1267964"/>
+          </a:xfrm>
+          <a:prstGeom prst="rect">
+            <a:avLst/>
+          </a:prstGeom>
+          <a:noFill/>
+          <a:ln>
+            <a:noFill/>
+          </a:ln>
+          <a:scene3d>
+            <a:camera prst="orthographicFront">
+              <a:rot lat="0" lon="10800000" rev="0"/>
+            </a:camera>
+            <a:lightRig rig="threePt" dir="t"/>
+          </a:scene3d>
+        </p:spPr>
+        <p:style>
+          <a:lnRef idx="2">
+            <a:schemeClr val="accent1">
+              <a:shade val="15000"/>
+            </a:schemeClr>
+          </a:lnRef>
+          <a:fillRef idx="1">
+            <a:schemeClr val="accent1"/>
+          </a:fillRef>
+          <a:effectRef idx="0">
+            <a:schemeClr val="accent1"/>
+          </a:effectRef>
+          <a:fontRef idx="minor">
+            <a:schemeClr val="lt1"/>
+          </a:fontRef>
+        </p:style>
+        <p:txBody>
+          <a:bodyPr rtlCol="0" anchor="ctr"/>
+          <a:lstStyle/>
+          <a:p>
+            <a:pPr algn="ctr"/>
+            <a:r>
+              <a:rPr lang="en-US" altLang="zh-CN" sz="8800" b="1" dirty="0">
+                <a:solidFill>
+                  <a:srgbClr val="E70012"/>
+                </a:solidFill>
+                <a:latin typeface="NimbusSanL" panose="00000500000000000000" pitchFamily="50" charset="0"/>
+                <a:ea typeface="Malgun Gothic" panose="020B0503020000020004" pitchFamily="34" charset="-127"/>
+              </a:rPr>
+              <a:t>R</a:t>
+            </a:r>
+            <a:r>
+              <a:rPr lang="en-US" altLang="zh-CN" sz="8800" b="1" dirty="0">
+                <a:solidFill>
+                  <a:srgbClr val="0070D1"/>
+                </a:solidFill>
+                <a:latin typeface="NimbusSanL" panose="00000500000000000000" pitchFamily="50" charset="0"/>
+                <a:ea typeface="Malgun Gothic" panose="020B0503020000020004" pitchFamily="34" charset="-127"/>
+              </a:rPr>
+              <a:t>S</a:t>
+            </a:r>
+            <a:r>
+              <a:rPr lang="en-US" altLang="zh-CN" sz="8800" b="1" dirty="0">
+                <a:solidFill>
+                  <a:schemeClr val="bg1"/>
+                </a:solidFill>
+                <a:latin typeface="NimbusSanL" panose="00000500000000000000" pitchFamily="50" charset="0"/>
+                <a:ea typeface="Malgun Gothic" panose="020B0503020000020004" pitchFamily="34" charset="-127"/>
+              </a:rPr>
+              <a:t>T</a:t>
+            </a:r>
+            <a:endParaRPr lang="zh-CN" altLang="en-US" sz="8800" b="1" dirty="0">
+              <a:solidFill>
+                <a:schemeClr val="bg1"/>
+              </a:solidFill>
+              <a:latin typeface="NimbusSanL" panose="00000500000000000000" pitchFamily="50" charset="0"/>
+              <a:ea typeface="Malgun Gothic" panose="020B0503020000020004" pitchFamily="34" charset="-127"/>
+            </a:endParaRPr>
+          </a:p>
+        </p:txBody>
+      </p:sp>
       <p:grpSp>
         <p:nvGrpSpPr>
           <p:cNvPr id="27" name="组合 26">
@@ -2988,9 +3080,9 @@
         <p:grpSpPr>
           <a:xfrm>
             <a:off x="2314111" y="1000349"/>
-            <a:ext cx="5533275" cy="1268210"/>
+            <a:ext cx="3411935" cy="1268210"/>
             <a:chOff x="2351365" y="1904182"/>
-            <a:chExt cx="5533275" cy="1268210"/>
+            <a:chExt cx="3411935" cy="1268210"/>
           </a:xfrm>
         </p:grpSpPr>
         <p:sp>
@@ -3072,82 +3164,6 @@
               <a:endParaRPr lang="zh-CN" altLang="en-US" sz="8800" b="1" dirty="0">
                 <a:solidFill>
                   <a:schemeClr val="bg1"/>
-                </a:solidFill>
-                <a:latin typeface="NimbusSanL" panose="00000500000000000000" pitchFamily="50" charset="0"/>
-                <a:ea typeface="Malgun Gothic" panose="020B0503020000020004" pitchFamily="34" charset="-127"/>
-              </a:endParaRPr>
-            </a:p>
-          </p:txBody>
-        </p:sp>
-        <p:sp>
-          <p:nvSpPr>
-            <p:cNvPr id="3" name="矩形 2">
-              <a:extLst>
-                <a:ext uri="{FF2B5EF4-FFF2-40B4-BE49-F238E27FC236}">
-                  <a16:creationId xmlns:a16="http://schemas.microsoft.com/office/drawing/2014/main" id="{97277975-D4C7-3E89-C749-69362BA5ED2A}"/>
-                </a:ext>
-              </a:extLst>
-            </p:cNvPr>
-            <p:cNvSpPr/>
-            <p:nvPr/>
-          </p:nvSpPr>
-          <p:spPr>
-            <a:xfrm rot="10800000">
-              <a:off x="4005886" y="1969319"/>
-              <a:ext cx="3878754" cy="998480"/>
-            </a:xfrm>
-            <a:prstGeom prst="rect">
-              <a:avLst/>
-            </a:prstGeom>
-            <a:noFill/>
-            <a:ln>
-              <a:noFill/>
-            </a:ln>
-          </p:spPr>
-          <p:style>
-            <a:lnRef idx="2">
-              <a:schemeClr val="accent1">
-                <a:shade val="15000"/>
-              </a:schemeClr>
-            </a:lnRef>
-            <a:fillRef idx="1">
-              <a:schemeClr val="accent1"/>
-            </a:fillRef>
-            <a:effectRef idx="0">
-              <a:schemeClr val="accent1"/>
-            </a:effectRef>
-            <a:fontRef idx="minor">
-              <a:schemeClr val="lt1"/>
-            </a:fontRef>
-          </p:style>
-          <p:txBody>
-            <a:bodyPr rtlCol="0" anchor="ctr"/>
-            <a:lstStyle/>
-            <a:p>
-              <a:pPr algn="ctr"/>
-              <a:r>
-                <a:rPr lang="en-US" altLang="zh-CN" sz="8800" b="1" dirty="0">
-                  <a:solidFill>
-                    <a:srgbClr val="E70012"/>
-                  </a:solidFill>
-                  <a:latin typeface="NimbusSanL" panose="00000500000000000000" pitchFamily="50" charset="0"/>
-                  <a:ea typeface="Malgun Gothic" panose="020B0503020000020004" pitchFamily="34" charset="-127"/>
-                </a:rPr>
-                <a:t>R</a:t>
-              </a:r>
-              <a:r>
-                <a:rPr lang="en-US" altLang="zh-CN" sz="8800" b="1" dirty="0">
-                  <a:solidFill>
-                    <a:srgbClr val="0070D1"/>
-                  </a:solidFill>
-                  <a:latin typeface="NimbusSanL" panose="00000500000000000000" pitchFamily="50" charset="0"/>
-                  <a:ea typeface="Malgun Gothic" panose="020B0503020000020004" pitchFamily="34" charset="-127"/>
-                </a:rPr>
-                <a:t>S</a:t>
-              </a:r>
-              <a:endParaRPr lang="zh-CN" altLang="en-US" sz="8800" b="1" dirty="0">
-                <a:solidFill>
-                  <a:srgbClr val="107B10"/>
                 </a:solidFill>
                 <a:latin typeface="NimbusSanL" panose="00000500000000000000" pitchFamily="50" charset="0"/>
                 <a:ea typeface="Malgun Gothic" panose="020B0503020000020004" pitchFamily="34" charset="-127"/>

</xml_diff>

<commit_message>
Logo to be ABBA like-style - Now left-side "RS" is mirrored, where right-side "SR" still. This should be more similar to original ABBA style.
</commit_message>
<xml_diff>
--- a/assets/logo-b.pptx
+++ b/assets/logo-b.pptx
@@ -243,7 +243,7 @@
           <a:p>
             <a:fld id="{3A3EC29E-C368-4866-8016-F0D15F380C02}" type="datetimeFigureOut">
               <a:rPr lang="zh-CN" altLang="en-US" smtClean="0"/>
-              <a:t>2025/5/12</a:t>
+              <a:t>2025/5/16</a:t>
             </a:fld>
             <a:endParaRPr lang="zh-CN" altLang="en-US"/>
           </a:p>
@@ -413,7 +413,7 @@
           <a:p>
             <a:fld id="{3A3EC29E-C368-4866-8016-F0D15F380C02}" type="datetimeFigureOut">
               <a:rPr lang="zh-CN" altLang="en-US" smtClean="0"/>
-              <a:t>2025/5/12</a:t>
+              <a:t>2025/5/16</a:t>
             </a:fld>
             <a:endParaRPr lang="zh-CN" altLang="en-US"/>
           </a:p>
@@ -593,7 +593,7 @@
           <a:p>
             <a:fld id="{3A3EC29E-C368-4866-8016-F0D15F380C02}" type="datetimeFigureOut">
               <a:rPr lang="zh-CN" altLang="en-US" smtClean="0"/>
-              <a:t>2025/5/12</a:t>
+              <a:t>2025/5/16</a:t>
             </a:fld>
             <a:endParaRPr lang="zh-CN" altLang="en-US"/>
           </a:p>
@@ -763,7 +763,7 @@
           <a:p>
             <a:fld id="{3A3EC29E-C368-4866-8016-F0D15F380C02}" type="datetimeFigureOut">
               <a:rPr lang="zh-CN" altLang="en-US" smtClean="0"/>
-              <a:t>2025/5/12</a:t>
+              <a:t>2025/5/16</a:t>
             </a:fld>
             <a:endParaRPr lang="zh-CN" altLang="en-US"/>
           </a:p>
@@ -1009,7 +1009,7 @@
           <a:p>
             <a:fld id="{3A3EC29E-C368-4866-8016-F0D15F380C02}" type="datetimeFigureOut">
               <a:rPr lang="zh-CN" altLang="en-US" smtClean="0"/>
-              <a:t>2025/5/12</a:t>
+              <a:t>2025/5/16</a:t>
             </a:fld>
             <a:endParaRPr lang="zh-CN" altLang="en-US"/>
           </a:p>
@@ -1241,7 +1241,7 @@
           <a:p>
             <a:fld id="{3A3EC29E-C368-4866-8016-F0D15F380C02}" type="datetimeFigureOut">
               <a:rPr lang="zh-CN" altLang="en-US" smtClean="0"/>
-              <a:t>2025/5/12</a:t>
+              <a:t>2025/5/16</a:t>
             </a:fld>
             <a:endParaRPr lang="zh-CN" altLang="en-US"/>
           </a:p>
@@ -1608,7 +1608,7 @@
           <a:p>
             <a:fld id="{3A3EC29E-C368-4866-8016-F0D15F380C02}" type="datetimeFigureOut">
               <a:rPr lang="zh-CN" altLang="en-US" smtClean="0"/>
-              <a:t>2025/5/12</a:t>
+              <a:t>2025/5/16</a:t>
             </a:fld>
             <a:endParaRPr lang="zh-CN" altLang="en-US"/>
           </a:p>
@@ -1726,7 +1726,7 @@
           <a:p>
             <a:fld id="{3A3EC29E-C368-4866-8016-F0D15F380C02}" type="datetimeFigureOut">
               <a:rPr lang="zh-CN" altLang="en-US" smtClean="0"/>
-              <a:t>2025/5/12</a:t>
+              <a:t>2025/5/16</a:t>
             </a:fld>
             <a:endParaRPr lang="zh-CN" altLang="en-US"/>
           </a:p>
@@ -1821,7 +1821,7 @@
           <a:p>
             <a:fld id="{3A3EC29E-C368-4866-8016-F0D15F380C02}" type="datetimeFigureOut">
               <a:rPr lang="zh-CN" altLang="en-US" smtClean="0"/>
-              <a:t>2025/5/12</a:t>
+              <a:t>2025/5/16</a:t>
             </a:fld>
             <a:endParaRPr lang="zh-CN" altLang="en-US"/>
           </a:p>
@@ -2098,7 +2098,7 @@
           <a:p>
             <a:fld id="{3A3EC29E-C368-4866-8016-F0D15F380C02}" type="datetimeFigureOut">
               <a:rPr lang="zh-CN" altLang="en-US" smtClean="0"/>
-              <a:t>2025/5/12</a:t>
+              <a:t>2025/5/16</a:t>
             </a:fld>
             <a:endParaRPr lang="zh-CN" altLang="en-US"/>
           </a:p>
@@ -2355,7 +2355,7 @@
           <a:p>
             <a:fld id="{3A3EC29E-C368-4866-8016-F0D15F380C02}" type="datetimeFigureOut">
               <a:rPr lang="zh-CN" altLang="en-US" smtClean="0"/>
-              <a:t>2025/5/12</a:t>
+              <a:t>2025/5/16</a:t>
             </a:fld>
             <a:endParaRPr lang="zh-CN" altLang="en-US"/>
           </a:p>
@@ -2568,7 +2568,7 @@
           <a:p>
             <a:fld id="{3A3EC29E-C368-4866-8016-F0D15F380C02}" type="datetimeFigureOut">
               <a:rPr lang="zh-CN" altLang="en-US" smtClean="0"/>
-              <a:t>2025/5/12</a:t>
+              <a:t>2025/5/16</a:t>
             </a:fld>
             <a:endParaRPr lang="zh-CN" altLang="en-US"/>
           </a:p>
@@ -2987,7 +2987,7 @@
         </p:nvSpPr>
         <p:spPr>
           <a:xfrm>
-            <a:off x="3874656" y="1000349"/>
+            <a:off x="2321091" y="1000850"/>
             <a:ext cx="3411935" cy="1267964"/>
           </a:xfrm>
           <a:prstGeom prst="rect">
@@ -3028,12 +3028,12 @@
             <a:r>
               <a:rPr lang="en-US" altLang="zh-CN" sz="8800" b="1" dirty="0">
                 <a:solidFill>
-                  <a:srgbClr val="E70012"/>
+                  <a:schemeClr val="bg1"/>
                 </a:solidFill>
                 <a:latin typeface="NimbusSanL" panose="00000500000000000000" pitchFamily="50" charset="0"/>
                 <a:ea typeface="Malgun Gothic" panose="020B0503020000020004" pitchFamily="34" charset="-127"/>
               </a:rPr>
-              <a:t>R</a:t>
+              <a:t>T</a:t>
             </a:r>
             <a:r>
               <a:rPr lang="en-US" altLang="zh-CN" sz="8800" b="1" dirty="0">
@@ -3048,12 +3048,12 @@
             <a:r>
               <a:rPr lang="en-US" altLang="zh-CN" sz="8800" b="1" dirty="0">
                 <a:solidFill>
-                  <a:schemeClr val="bg1"/>
+                  <a:srgbClr val="E70012"/>
                 </a:solidFill>
                 <a:latin typeface="NimbusSanL" panose="00000500000000000000" pitchFamily="50" charset="0"/>
                 <a:ea typeface="Malgun Gothic" panose="020B0503020000020004" pitchFamily="34" charset="-127"/>
               </a:rPr>
-              <a:t>T</a:t>
+              <a:t>R</a:t>
             </a:r>
             <a:endParaRPr lang="zh-CN" altLang="en-US" sz="8800" b="1" dirty="0">
               <a:solidFill>
@@ -3065,231 +3065,210 @@
           </a:p>
         </p:txBody>
       </p:sp>
-      <p:grpSp>
-        <p:nvGrpSpPr>
-          <p:cNvPr id="27" name="组合 26">
+      <p:sp>
+        <p:nvSpPr>
+          <p:cNvPr id="2" name="矩形 1">
             <a:extLst>
               <a:ext uri="{FF2B5EF4-FFF2-40B4-BE49-F238E27FC236}">
-                <a16:creationId xmlns:a16="http://schemas.microsoft.com/office/drawing/2014/main" id="{1FC3D2BE-005F-A412-6CCB-D53AE30D4700}"/>
+                <a16:creationId xmlns:a16="http://schemas.microsoft.com/office/drawing/2014/main" id="{D0EB05AC-47E2-9982-CDA8-A8228DD22798}"/>
               </a:ext>
             </a:extLst>
           </p:cNvPr>
-          <p:cNvGrpSpPr/>
+          <p:cNvSpPr/>
           <p:nvPr/>
-        </p:nvGrpSpPr>
-        <p:grpSpPr>
+        </p:nvSpPr>
+        <p:spPr>
           <a:xfrm>
-            <a:off x="2314111" y="1000349"/>
-            <a:ext cx="3411935" cy="1268210"/>
-            <a:chOff x="2351365" y="1904182"/>
-            <a:chExt cx="3411935" cy="1268210"/>
+            <a:off x="3868303" y="1000850"/>
+            <a:ext cx="3411935" cy="1267964"/>
           </a:xfrm>
-        </p:grpSpPr>
-        <p:sp>
-          <p:nvSpPr>
-            <p:cNvPr id="2" name="矩形 1">
-              <a:extLst>
-                <a:ext uri="{FF2B5EF4-FFF2-40B4-BE49-F238E27FC236}">
-                  <a16:creationId xmlns:a16="http://schemas.microsoft.com/office/drawing/2014/main" id="{D0EB05AC-47E2-9982-CDA8-A8228DD22798}"/>
-                </a:ext>
-              </a:extLst>
-            </p:cNvPr>
-            <p:cNvSpPr/>
-            <p:nvPr/>
-          </p:nvSpPr>
-          <p:spPr>
-            <a:xfrm>
-              <a:off x="2351365" y="1904428"/>
-              <a:ext cx="3411935" cy="1267964"/>
-            </a:xfrm>
-            <a:prstGeom prst="rect">
-              <a:avLst/>
-            </a:prstGeom>
+          <a:prstGeom prst="rect">
+            <a:avLst/>
+          </a:prstGeom>
+          <a:noFill/>
+          <a:ln>
             <a:noFill/>
-            <a:ln>
-              <a:noFill/>
-            </a:ln>
-          </p:spPr>
-          <p:style>
-            <a:lnRef idx="2">
-              <a:schemeClr val="accent1">
-                <a:shade val="15000"/>
-              </a:schemeClr>
-            </a:lnRef>
-            <a:fillRef idx="1">
-              <a:schemeClr val="accent1"/>
-            </a:fillRef>
-            <a:effectRef idx="0">
-              <a:schemeClr val="accent1"/>
-            </a:effectRef>
-            <a:fontRef idx="minor">
-              <a:schemeClr val="lt1"/>
-            </a:fontRef>
-          </p:style>
-          <p:txBody>
-            <a:bodyPr rtlCol="0" anchor="ctr"/>
-            <a:lstStyle/>
-            <a:p>
-              <a:pPr algn="ctr"/>
-              <a:r>
-                <a:rPr lang="en-US" altLang="zh-CN" sz="8800" b="1" dirty="0">
-                  <a:solidFill>
-                    <a:srgbClr val="E70012"/>
-                  </a:solidFill>
-                  <a:latin typeface="NimbusSanL" panose="00000500000000000000" pitchFamily="50" charset="0"/>
-                  <a:ea typeface="Malgun Gothic" panose="020B0503020000020004" pitchFamily="34" charset="-127"/>
-                </a:rPr>
-                <a:t>R</a:t>
-              </a:r>
-              <a:r>
-                <a:rPr lang="en-US" altLang="zh-CN" sz="8800" b="1" dirty="0">
-                  <a:solidFill>
-                    <a:srgbClr val="0070D1"/>
-                  </a:solidFill>
-                  <a:latin typeface="NimbusSanL" panose="00000500000000000000" pitchFamily="50" charset="0"/>
-                  <a:ea typeface="Malgun Gothic" panose="020B0503020000020004" pitchFamily="34" charset="-127"/>
-                </a:rPr>
-                <a:t>S</a:t>
-              </a:r>
-              <a:r>
-                <a:rPr lang="en-US" altLang="zh-CN" sz="8800" b="1" dirty="0">
-                  <a:solidFill>
-                    <a:schemeClr val="bg1"/>
-                  </a:solidFill>
-                  <a:latin typeface="NimbusSanL" panose="00000500000000000000" pitchFamily="50" charset="0"/>
-                  <a:ea typeface="Malgun Gothic" panose="020B0503020000020004" pitchFamily="34" charset="-127"/>
-                </a:rPr>
-                <a:t>T</a:t>
-              </a:r>
-              <a:endParaRPr lang="zh-CN" altLang="en-US" sz="8800" b="1" dirty="0">
+          </a:ln>
+        </p:spPr>
+        <p:style>
+          <a:lnRef idx="2">
+            <a:schemeClr val="accent1">
+              <a:shade val="15000"/>
+            </a:schemeClr>
+          </a:lnRef>
+          <a:fillRef idx="1">
+            <a:schemeClr val="accent1"/>
+          </a:fillRef>
+          <a:effectRef idx="0">
+            <a:schemeClr val="accent1"/>
+          </a:effectRef>
+          <a:fontRef idx="minor">
+            <a:schemeClr val="lt1"/>
+          </a:fontRef>
+        </p:style>
+        <p:txBody>
+          <a:bodyPr rtlCol="0" anchor="ctr"/>
+          <a:lstStyle/>
+          <a:p>
+            <a:pPr algn="ctr"/>
+            <a:r>
+              <a:rPr lang="en-US" altLang="zh-CN" sz="8800" b="1" dirty="0">
                 <a:solidFill>
                   <a:schemeClr val="bg1"/>
                 </a:solidFill>
                 <a:latin typeface="NimbusSanL" panose="00000500000000000000" pitchFamily="50" charset="0"/>
                 <a:ea typeface="Malgun Gothic" panose="020B0503020000020004" pitchFamily="34" charset="-127"/>
-              </a:endParaRPr>
-            </a:p>
-          </p:txBody>
-        </p:sp>
-        <p:sp>
-          <p:nvSpPr>
-            <p:cNvPr id="24" name="矩形 23">
-              <a:extLst>
-                <a:ext uri="{FF2B5EF4-FFF2-40B4-BE49-F238E27FC236}">
-                  <a16:creationId xmlns:a16="http://schemas.microsoft.com/office/drawing/2014/main" id="{F2E392BA-8781-9722-4AE8-ACE59D866E6F}"/>
-                </a:ext>
-              </a:extLst>
-            </p:cNvPr>
-            <p:cNvSpPr/>
-            <p:nvPr/>
-          </p:nvSpPr>
-          <p:spPr>
-            <a:xfrm>
-              <a:off x="3918261" y="1904182"/>
-              <a:ext cx="1841864" cy="1267964"/>
-            </a:xfrm>
-            <a:prstGeom prst="rect">
-              <a:avLst/>
-            </a:prstGeom>
+              </a:rPr>
+              <a:t>T</a:t>
+            </a:r>
+            <a:r>
+              <a:rPr lang="en-US" altLang="zh-CN" sz="8800" b="1" dirty="0">
+                <a:solidFill>
+                  <a:srgbClr val="0070D1"/>
+                </a:solidFill>
+                <a:latin typeface="NimbusSanL" panose="00000500000000000000" pitchFamily="50" charset="0"/>
+                <a:ea typeface="Malgun Gothic" panose="020B0503020000020004" pitchFamily="34" charset="-127"/>
+              </a:rPr>
+              <a:t>S</a:t>
+            </a:r>
+            <a:r>
+              <a:rPr lang="en-US" altLang="zh-CN" sz="8800" b="1" dirty="0">
+                <a:solidFill>
+                  <a:srgbClr val="E70012"/>
+                </a:solidFill>
+                <a:latin typeface="NimbusSanL" panose="00000500000000000000" pitchFamily="50" charset="0"/>
+                <a:ea typeface="Malgun Gothic" panose="020B0503020000020004" pitchFamily="34" charset="-127"/>
+              </a:rPr>
+              <a:t>R</a:t>
+            </a:r>
+            <a:endParaRPr lang="zh-CN" altLang="en-US" sz="8800" b="1" dirty="0">
+              <a:solidFill>
+                <a:schemeClr val="bg1"/>
+              </a:solidFill>
+              <a:latin typeface="NimbusSanL" panose="00000500000000000000" pitchFamily="50" charset="0"/>
+              <a:ea typeface="Malgun Gothic" panose="020B0503020000020004" pitchFamily="34" charset="-127"/>
+            </a:endParaRPr>
+          </a:p>
+        </p:txBody>
+      </p:sp>
+      <p:sp>
+        <p:nvSpPr>
+          <p:cNvPr id="24" name="矩形 23">
+            <a:extLst>
+              <a:ext uri="{FF2B5EF4-FFF2-40B4-BE49-F238E27FC236}">
+                <a16:creationId xmlns:a16="http://schemas.microsoft.com/office/drawing/2014/main" id="{F2E392BA-8781-9722-4AE8-ACE59D866E6F}"/>
+              </a:ext>
+            </a:extLst>
+          </p:cNvPr>
+          <p:cNvSpPr/>
+          <p:nvPr/>
+        </p:nvSpPr>
+        <p:spPr>
+          <a:xfrm>
+            <a:off x="3881007" y="1000349"/>
+            <a:ext cx="1841864" cy="1267964"/>
+          </a:xfrm>
+          <a:prstGeom prst="rect">
+            <a:avLst/>
+          </a:prstGeom>
+          <a:noFill/>
+          <a:ln>
             <a:noFill/>
-            <a:ln>
-              <a:noFill/>
-            </a:ln>
-          </p:spPr>
-          <p:style>
-            <a:lnRef idx="2">
-              <a:schemeClr val="accent1">
-                <a:shade val="15000"/>
-              </a:schemeClr>
-            </a:lnRef>
-            <a:fillRef idx="1">
-              <a:schemeClr val="accent1"/>
-            </a:fillRef>
-            <a:effectRef idx="0">
-              <a:schemeClr val="accent1"/>
-            </a:effectRef>
-            <a:fontRef idx="minor">
-              <a:schemeClr val="lt1"/>
-            </a:fontRef>
-          </p:style>
-          <p:txBody>
-            <a:bodyPr rtlCol="0" anchor="ctr"/>
-            <a:lstStyle/>
-            <a:p>
-              <a:pPr algn="ctr"/>
-              <a:r>
-                <a:rPr lang="en-US" altLang="zh-CN" sz="8800" b="1" dirty="0">
-                  <a:solidFill>
-                    <a:srgbClr val="107B10"/>
-                  </a:solidFill>
-                  <a:latin typeface="NimbusSanL" panose="00000500000000000000" pitchFamily="50" charset="0"/>
-                  <a:ea typeface="Malgun Gothic" panose="020B0503020000020004" pitchFamily="34" charset="-127"/>
-                </a:rPr>
-                <a:t>I</a:t>
-              </a:r>
-              <a:endParaRPr lang="zh-CN" altLang="en-US" sz="8800" b="1" dirty="0">
+          </a:ln>
+        </p:spPr>
+        <p:style>
+          <a:lnRef idx="2">
+            <a:schemeClr val="accent1">
+              <a:shade val="15000"/>
+            </a:schemeClr>
+          </a:lnRef>
+          <a:fillRef idx="1">
+            <a:schemeClr val="accent1"/>
+          </a:fillRef>
+          <a:effectRef idx="0">
+            <a:schemeClr val="accent1"/>
+          </a:effectRef>
+          <a:fontRef idx="minor">
+            <a:schemeClr val="lt1"/>
+          </a:fontRef>
+        </p:style>
+        <p:txBody>
+          <a:bodyPr rtlCol="0" anchor="ctr"/>
+          <a:lstStyle/>
+          <a:p>
+            <a:pPr algn="ctr"/>
+            <a:r>
+              <a:rPr lang="en-US" altLang="zh-CN" sz="8800" b="1" dirty="0">
                 <a:solidFill>
                   <a:srgbClr val="107B10"/>
                 </a:solidFill>
                 <a:latin typeface="NimbusSanL" panose="00000500000000000000" pitchFamily="50" charset="0"/>
                 <a:ea typeface="Malgun Gothic" panose="020B0503020000020004" pitchFamily="34" charset="-127"/>
-              </a:endParaRPr>
-            </a:p>
-          </p:txBody>
-        </p:sp>
-        <p:sp>
-          <p:nvSpPr>
-            <p:cNvPr id="26" name="椭圆 25">
-              <a:extLst>
-                <a:ext uri="{FF2B5EF4-FFF2-40B4-BE49-F238E27FC236}">
-                  <a16:creationId xmlns:a16="http://schemas.microsoft.com/office/drawing/2014/main" id="{3E3F38F6-C969-1258-1BC9-02D1E2E04EE8}"/>
-                </a:ext>
-              </a:extLst>
-            </p:cNvPr>
-            <p:cNvSpPr/>
-            <p:nvPr/>
-          </p:nvSpPr>
-          <p:spPr>
-            <a:xfrm>
-              <a:off x="4498903" y="2075079"/>
-              <a:ext cx="680580" cy="191869"/>
-            </a:xfrm>
-            <a:prstGeom prst="ellipse">
-              <a:avLst/>
-            </a:prstGeom>
-            <a:solidFill>
-              <a:srgbClr val="107B10"/>
-            </a:solidFill>
-            <a:ln>
-              <a:noFill/>
-            </a:ln>
-          </p:spPr>
-          <p:style>
-            <a:lnRef idx="2">
-              <a:schemeClr val="accent1">
-                <a:shade val="15000"/>
-              </a:schemeClr>
-            </a:lnRef>
-            <a:fillRef idx="1">
-              <a:schemeClr val="accent1"/>
-            </a:fillRef>
-            <a:effectRef idx="0">
-              <a:schemeClr val="accent1"/>
-            </a:effectRef>
-            <a:fontRef idx="minor">
-              <a:schemeClr val="lt1"/>
-            </a:fontRef>
-          </p:style>
-          <p:txBody>
-            <a:bodyPr rtlCol="0" anchor="ctr"/>
-            <a:lstStyle/>
-            <a:p>
-              <a:pPr algn="ctr"/>
-              <a:endParaRPr lang="zh-CN" altLang="en-US"/>
-            </a:p>
-          </p:txBody>
-        </p:sp>
-      </p:grpSp>
+              </a:rPr>
+              <a:t>I</a:t>
+            </a:r>
+            <a:endParaRPr lang="zh-CN" altLang="en-US" sz="8800" b="1" dirty="0">
+              <a:solidFill>
+                <a:srgbClr val="107B10"/>
+              </a:solidFill>
+              <a:latin typeface="NimbusSanL" panose="00000500000000000000" pitchFamily="50" charset="0"/>
+              <a:ea typeface="Malgun Gothic" panose="020B0503020000020004" pitchFamily="34" charset="-127"/>
+            </a:endParaRPr>
+          </a:p>
+        </p:txBody>
+      </p:sp>
+      <p:sp>
+        <p:nvSpPr>
+          <p:cNvPr id="26" name="椭圆 25">
+            <a:extLst>
+              <a:ext uri="{FF2B5EF4-FFF2-40B4-BE49-F238E27FC236}">
+                <a16:creationId xmlns:a16="http://schemas.microsoft.com/office/drawing/2014/main" id="{3E3F38F6-C969-1258-1BC9-02D1E2E04EE8}"/>
+              </a:ext>
+            </a:extLst>
+          </p:cNvPr>
+          <p:cNvSpPr/>
+          <p:nvPr/>
+        </p:nvSpPr>
+        <p:spPr>
+          <a:xfrm>
+            <a:off x="4461649" y="1171246"/>
+            <a:ext cx="680580" cy="191869"/>
+          </a:xfrm>
+          <a:prstGeom prst="ellipse">
+            <a:avLst/>
+          </a:prstGeom>
+          <a:solidFill>
+            <a:srgbClr val="107B10"/>
+          </a:solidFill>
+          <a:ln>
+            <a:noFill/>
+          </a:ln>
+        </p:spPr>
+        <p:style>
+          <a:lnRef idx="2">
+            <a:schemeClr val="accent1">
+              <a:shade val="15000"/>
+            </a:schemeClr>
+          </a:lnRef>
+          <a:fillRef idx="1">
+            <a:schemeClr val="accent1"/>
+          </a:fillRef>
+          <a:effectRef idx="0">
+            <a:schemeClr val="accent1"/>
+          </a:effectRef>
+          <a:fontRef idx="minor">
+            <a:schemeClr val="lt1"/>
+          </a:fontRef>
+        </p:style>
+        <p:txBody>
+          <a:bodyPr rtlCol="0" anchor="ctr"/>
+          <a:lstStyle/>
+          <a:p>
+            <a:pPr algn="ctr"/>
+            <a:endParaRPr lang="zh-CN" altLang="en-US"/>
+          </a:p>
+        </p:txBody>
+      </p:sp>
       <p:grpSp>
         <p:nvGrpSpPr>
           <p:cNvPr id="49" name="组合 48">

</xml_diff>

<commit_message>
meta -- changed secondary name of RSTSR
</commit_message>
<xml_diff>
--- a/assets/logo-b.pptx
+++ b/assets/logo-b.pptx
@@ -243,7 +243,7 @@
           <a:p>
             <a:fld id="{3A3EC29E-C368-4866-8016-F0D15F380C02}" type="datetimeFigureOut">
               <a:rPr lang="zh-CN" altLang="en-US" smtClean="0"/>
-              <a:t>2025/5/16</a:t>
+              <a:t>2025/9/26</a:t>
             </a:fld>
             <a:endParaRPr lang="zh-CN" altLang="en-US"/>
           </a:p>
@@ -413,7 +413,7 @@
           <a:p>
             <a:fld id="{3A3EC29E-C368-4866-8016-F0D15F380C02}" type="datetimeFigureOut">
               <a:rPr lang="zh-CN" altLang="en-US" smtClean="0"/>
-              <a:t>2025/5/16</a:t>
+              <a:t>2025/9/26</a:t>
             </a:fld>
             <a:endParaRPr lang="zh-CN" altLang="en-US"/>
           </a:p>
@@ -593,7 +593,7 @@
           <a:p>
             <a:fld id="{3A3EC29E-C368-4866-8016-F0D15F380C02}" type="datetimeFigureOut">
               <a:rPr lang="zh-CN" altLang="en-US" smtClean="0"/>
-              <a:t>2025/5/16</a:t>
+              <a:t>2025/9/26</a:t>
             </a:fld>
             <a:endParaRPr lang="zh-CN" altLang="en-US"/>
           </a:p>
@@ -763,7 +763,7 @@
           <a:p>
             <a:fld id="{3A3EC29E-C368-4866-8016-F0D15F380C02}" type="datetimeFigureOut">
               <a:rPr lang="zh-CN" altLang="en-US" smtClean="0"/>
-              <a:t>2025/5/16</a:t>
+              <a:t>2025/9/26</a:t>
             </a:fld>
             <a:endParaRPr lang="zh-CN" altLang="en-US"/>
           </a:p>
@@ -1009,7 +1009,7 @@
           <a:p>
             <a:fld id="{3A3EC29E-C368-4866-8016-F0D15F380C02}" type="datetimeFigureOut">
               <a:rPr lang="zh-CN" altLang="en-US" smtClean="0"/>
-              <a:t>2025/5/16</a:t>
+              <a:t>2025/9/26</a:t>
             </a:fld>
             <a:endParaRPr lang="zh-CN" altLang="en-US"/>
           </a:p>
@@ -1241,7 +1241,7 @@
           <a:p>
             <a:fld id="{3A3EC29E-C368-4866-8016-F0D15F380C02}" type="datetimeFigureOut">
               <a:rPr lang="zh-CN" altLang="en-US" smtClean="0"/>
-              <a:t>2025/5/16</a:t>
+              <a:t>2025/9/26</a:t>
             </a:fld>
             <a:endParaRPr lang="zh-CN" altLang="en-US"/>
           </a:p>
@@ -1608,7 +1608,7 @@
           <a:p>
             <a:fld id="{3A3EC29E-C368-4866-8016-F0D15F380C02}" type="datetimeFigureOut">
               <a:rPr lang="zh-CN" altLang="en-US" smtClean="0"/>
-              <a:t>2025/5/16</a:t>
+              <a:t>2025/9/26</a:t>
             </a:fld>
             <a:endParaRPr lang="zh-CN" altLang="en-US"/>
           </a:p>
@@ -1726,7 +1726,7 @@
           <a:p>
             <a:fld id="{3A3EC29E-C368-4866-8016-F0D15F380C02}" type="datetimeFigureOut">
               <a:rPr lang="zh-CN" altLang="en-US" smtClean="0"/>
-              <a:t>2025/5/16</a:t>
+              <a:t>2025/9/26</a:t>
             </a:fld>
             <a:endParaRPr lang="zh-CN" altLang="en-US"/>
           </a:p>
@@ -1821,7 +1821,7 @@
           <a:p>
             <a:fld id="{3A3EC29E-C368-4866-8016-F0D15F380C02}" type="datetimeFigureOut">
               <a:rPr lang="zh-CN" altLang="en-US" smtClean="0"/>
-              <a:t>2025/5/16</a:t>
+              <a:t>2025/9/26</a:t>
             </a:fld>
             <a:endParaRPr lang="zh-CN" altLang="en-US"/>
           </a:p>
@@ -2098,7 +2098,7 @@
           <a:p>
             <a:fld id="{3A3EC29E-C368-4866-8016-F0D15F380C02}" type="datetimeFigureOut">
               <a:rPr lang="zh-CN" altLang="en-US" smtClean="0"/>
-              <a:t>2025/5/16</a:t>
+              <a:t>2025/9/26</a:t>
             </a:fld>
             <a:endParaRPr lang="zh-CN" altLang="en-US"/>
           </a:p>
@@ -2355,7 +2355,7 @@
           <a:p>
             <a:fld id="{3A3EC29E-C368-4866-8016-F0D15F380C02}" type="datetimeFigureOut">
               <a:rPr lang="zh-CN" altLang="en-US" smtClean="0"/>
-              <a:t>2025/5/16</a:t>
+              <a:t>2025/9/26</a:t>
             </a:fld>
             <a:endParaRPr lang="zh-CN" altLang="en-US"/>
           </a:p>
@@ -2568,7 +2568,7 @@
           <a:p>
             <a:fld id="{3A3EC29E-C368-4866-8016-F0D15F380C02}" type="datetimeFigureOut">
               <a:rPr lang="zh-CN" altLang="en-US" smtClean="0"/>
-              <a:t>2025/5/16</a:t>
+              <a:t>2025/9/26</a:t>
             </a:fld>
             <a:endParaRPr lang="zh-CN" altLang="en-US"/>
           </a:p>
@@ -4567,8 +4567,8 @@
         </p:nvSpPr>
         <p:spPr>
           <a:xfrm>
-            <a:off x="4478090" y="2544592"/>
-            <a:ext cx="2375971" cy="253916"/>
+            <a:off x="4513221" y="2544592"/>
+            <a:ext cx="2310248" cy="253916"/>
           </a:xfrm>
           <a:prstGeom prst="rect">
             <a:avLst/>
@@ -4581,6 +4581,7 @@
           </a:bodyPr>
           <a:lstStyle/>
           <a:p>
+            <a:pPr algn="r"/>
             <a:r>
               <a:rPr lang="en-US" altLang="zh-CN" sz="1050" dirty="0">
                 <a:latin typeface="Arno Pro Smbd Caption" panose="02020702040506090403" pitchFamily="18" charset="0"/>
@@ -4591,7 +4592,7 @@
               <a:rPr lang="en-US" altLang="zh-CN" sz="1050" dirty="0">
                 <a:latin typeface="Arno Pro Smbd" panose="02020702050506020403" pitchFamily="18" charset="0"/>
               </a:rPr>
-              <a:t> Subproject of </a:t>
+              <a:t> </a:t>
             </a:r>
             <a:r>
               <a:rPr lang="en-US" altLang="zh-CN" sz="1050" dirty="0">
@@ -4606,7 +4607,7 @@
               <a:rPr lang="en-US" altLang="zh-CN" sz="1050" dirty="0">
                 <a:latin typeface="Arno Pro Smbd" panose="02020702050506020403" pitchFamily="18" charset="0"/>
               </a:rPr>
-              <a:t>E</a:t>
+              <a:t>EST </a:t>
             </a:r>
             <a:r>
               <a:rPr lang="en-US" altLang="zh-CN" sz="1050" dirty="0">
@@ -4621,7 +4622,7 @@
               <a:rPr lang="en-US" altLang="zh-CN" sz="1050" dirty="0">
                 <a:latin typeface="Arno Pro Smbd" panose="02020702050506020403" pitchFamily="18" charset="0"/>
               </a:rPr>
-              <a:t>T for </a:t>
+              <a:t>ubproject for </a:t>
             </a:r>
             <a:r>
               <a:rPr lang="en-US" altLang="zh-CN" sz="1050" dirty="0">

</xml_diff>